<commit_message>
versjon av dokumenter som er oversendt til Kjeller V.
</commit_message>
<xml_diff>
--- a/doc/presentasjon_concept0_loadcell.pptx
+++ b/doc/presentasjon_concept0_loadcell.pptx
@@ -265,7 +265,7 @@
           <a:p>
             <a:fld id="{2EBB3FA4-2E6E-4E61-A551-D0F605A452AF}" type="datetimeFigureOut">
               <a:rPr lang="en-GB" smtClean="0"/>
-              <a:t>20/08/2017</a:t>
+              <a:t>23/08/2017</a:t>
             </a:fld>
             <a:endParaRPr lang="en-GB"/>
           </a:p>
@@ -435,7 +435,7 @@
           <a:p>
             <a:fld id="{2EBB3FA4-2E6E-4E61-A551-D0F605A452AF}" type="datetimeFigureOut">
               <a:rPr lang="en-GB" smtClean="0"/>
-              <a:t>20/08/2017</a:t>
+              <a:t>23/08/2017</a:t>
             </a:fld>
             <a:endParaRPr lang="en-GB"/>
           </a:p>
@@ -615,7 +615,7 @@
           <a:p>
             <a:fld id="{2EBB3FA4-2E6E-4E61-A551-D0F605A452AF}" type="datetimeFigureOut">
               <a:rPr lang="en-GB" smtClean="0"/>
-              <a:t>20/08/2017</a:t>
+              <a:t>23/08/2017</a:t>
             </a:fld>
             <a:endParaRPr lang="en-GB"/>
           </a:p>
@@ -785,7 +785,7 @@
           <a:p>
             <a:fld id="{2EBB3FA4-2E6E-4E61-A551-D0F605A452AF}" type="datetimeFigureOut">
               <a:rPr lang="en-GB" smtClean="0"/>
-              <a:t>20/08/2017</a:t>
+              <a:t>23/08/2017</a:t>
             </a:fld>
             <a:endParaRPr lang="en-GB"/>
           </a:p>
@@ -1031,7 +1031,7 @@
           <a:p>
             <a:fld id="{2EBB3FA4-2E6E-4E61-A551-D0F605A452AF}" type="datetimeFigureOut">
               <a:rPr lang="en-GB" smtClean="0"/>
-              <a:t>20/08/2017</a:t>
+              <a:t>23/08/2017</a:t>
             </a:fld>
             <a:endParaRPr lang="en-GB"/>
           </a:p>
@@ -1263,7 +1263,7 @@
           <a:p>
             <a:fld id="{2EBB3FA4-2E6E-4E61-A551-D0F605A452AF}" type="datetimeFigureOut">
               <a:rPr lang="en-GB" smtClean="0"/>
-              <a:t>20/08/2017</a:t>
+              <a:t>23/08/2017</a:t>
             </a:fld>
             <a:endParaRPr lang="en-GB"/>
           </a:p>
@@ -1630,7 +1630,7 @@
           <a:p>
             <a:fld id="{2EBB3FA4-2E6E-4E61-A551-D0F605A452AF}" type="datetimeFigureOut">
               <a:rPr lang="en-GB" smtClean="0"/>
-              <a:t>20/08/2017</a:t>
+              <a:t>23/08/2017</a:t>
             </a:fld>
             <a:endParaRPr lang="en-GB"/>
           </a:p>
@@ -1748,7 +1748,7 @@
           <a:p>
             <a:fld id="{2EBB3FA4-2E6E-4E61-A551-D0F605A452AF}" type="datetimeFigureOut">
               <a:rPr lang="en-GB" smtClean="0"/>
-              <a:t>20/08/2017</a:t>
+              <a:t>23/08/2017</a:t>
             </a:fld>
             <a:endParaRPr lang="en-GB"/>
           </a:p>
@@ -1843,7 +1843,7 @@
           <a:p>
             <a:fld id="{2EBB3FA4-2E6E-4E61-A551-D0F605A452AF}" type="datetimeFigureOut">
               <a:rPr lang="en-GB" smtClean="0"/>
-              <a:t>20/08/2017</a:t>
+              <a:t>23/08/2017</a:t>
             </a:fld>
             <a:endParaRPr lang="en-GB"/>
           </a:p>
@@ -2120,7 +2120,7 @@
           <a:p>
             <a:fld id="{2EBB3FA4-2E6E-4E61-A551-D0F605A452AF}" type="datetimeFigureOut">
               <a:rPr lang="en-GB" smtClean="0"/>
-              <a:t>20/08/2017</a:t>
+              <a:t>23/08/2017</a:t>
             </a:fld>
             <a:endParaRPr lang="en-GB"/>
           </a:p>
@@ -2373,7 +2373,7 @@
           <a:p>
             <a:fld id="{2EBB3FA4-2E6E-4E61-A551-D0F605A452AF}" type="datetimeFigureOut">
               <a:rPr lang="en-GB" smtClean="0"/>
-              <a:t>20/08/2017</a:t>
+              <a:t>23/08/2017</a:t>
             </a:fld>
             <a:endParaRPr lang="en-GB"/>
           </a:p>
@@ -2586,7 +2586,7 @@
           <a:p>
             <a:fld id="{2EBB3FA4-2E6E-4E61-A551-D0F605A452AF}" type="datetimeFigureOut">
               <a:rPr lang="en-GB" smtClean="0"/>
-              <a:t>20/08/2017</a:t>
+              <a:t>23/08/2017</a:t>
             </a:fld>
             <a:endParaRPr lang="en-GB"/>
           </a:p>

</xml_diff>